<commit_message>
documentation from latest branch
</commit_message>
<xml_diff>
--- a/doc/dia/diagrams.pptx
+++ b/doc/dia/diagrams.pptx
@@ -5,7 +5,10 @@
     <p:sldMasterId id="2147483648" r:id="rId1"/>
   </p:sldMasterIdLst>
   <p:sldIdLst>
-    <p:sldId id="257" r:id="rId2"/>
+    <p:sldId id="258" r:id="rId2"/>
+    <p:sldId id="261" r:id="rId3"/>
+    <p:sldId id="259" r:id="rId4"/>
+    <p:sldId id="260" r:id="rId5"/>
   </p:sldIdLst>
   <p:sldSz cx="9144000" cy="6858000" type="screen4x3"/>
   <p:notesSz cx="6858000" cy="9144000"/>
@@ -288,7 +291,7 @@
           <a:p>
             <a:fld id="{00FF5EA5-A73B-8A4E-AB52-D6AFD1DD9D16}" type="datetimeFigureOut">
               <a:rPr lang="en-US" smtClean="0"/>
-              <a:t>27/01/2013</a:t>
+              <a:t>10/03/2013</a:t>
             </a:fld>
             <a:endParaRPr lang="en-US"/>
           </a:p>
@@ -458,7 +461,7 @@
           <a:p>
             <a:fld id="{00FF5EA5-A73B-8A4E-AB52-D6AFD1DD9D16}" type="datetimeFigureOut">
               <a:rPr lang="en-US" smtClean="0"/>
-              <a:t>27/01/2013</a:t>
+              <a:t>10/03/2013</a:t>
             </a:fld>
             <a:endParaRPr lang="en-US"/>
           </a:p>
@@ -638,7 +641,7 @@
           <a:p>
             <a:fld id="{00FF5EA5-A73B-8A4E-AB52-D6AFD1DD9D16}" type="datetimeFigureOut">
               <a:rPr lang="en-US" smtClean="0"/>
-              <a:t>27/01/2013</a:t>
+              <a:t>10/03/2013</a:t>
             </a:fld>
             <a:endParaRPr lang="en-US"/>
           </a:p>
@@ -808,7 +811,7 @@
           <a:p>
             <a:fld id="{00FF5EA5-A73B-8A4E-AB52-D6AFD1DD9D16}" type="datetimeFigureOut">
               <a:rPr lang="en-US" smtClean="0"/>
-              <a:t>27/01/2013</a:t>
+              <a:t>10/03/2013</a:t>
             </a:fld>
             <a:endParaRPr lang="en-US"/>
           </a:p>
@@ -1054,7 +1057,7 @@
           <a:p>
             <a:fld id="{00FF5EA5-A73B-8A4E-AB52-D6AFD1DD9D16}" type="datetimeFigureOut">
               <a:rPr lang="en-US" smtClean="0"/>
-              <a:t>27/01/2013</a:t>
+              <a:t>10/03/2013</a:t>
             </a:fld>
             <a:endParaRPr lang="en-US"/>
           </a:p>
@@ -1342,7 +1345,7 @@
           <a:p>
             <a:fld id="{00FF5EA5-A73B-8A4E-AB52-D6AFD1DD9D16}" type="datetimeFigureOut">
               <a:rPr lang="en-US" smtClean="0"/>
-              <a:t>27/01/2013</a:t>
+              <a:t>10/03/2013</a:t>
             </a:fld>
             <a:endParaRPr lang="en-US"/>
           </a:p>
@@ -1764,7 +1767,7 @@
           <a:p>
             <a:fld id="{00FF5EA5-A73B-8A4E-AB52-D6AFD1DD9D16}" type="datetimeFigureOut">
               <a:rPr lang="en-US" smtClean="0"/>
-              <a:t>27/01/2013</a:t>
+              <a:t>10/03/2013</a:t>
             </a:fld>
             <a:endParaRPr lang="en-US"/>
           </a:p>
@@ -1882,7 +1885,7 @@
           <a:p>
             <a:fld id="{00FF5EA5-A73B-8A4E-AB52-D6AFD1DD9D16}" type="datetimeFigureOut">
               <a:rPr lang="en-US" smtClean="0"/>
-              <a:t>27/01/2013</a:t>
+              <a:t>10/03/2013</a:t>
             </a:fld>
             <a:endParaRPr lang="en-US"/>
           </a:p>
@@ -1977,7 +1980,7 @@
           <a:p>
             <a:fld id="{00FF5EA5-A73B-8A4E-AB52-D6AFD1DD9D16}" type="datetimeFigureOut">
               <a:rPr lang="en-US" smtClean="0"/>
-              <a:t>27/01/2013</a:t>
+              <a:t>10/03/2013</a:t>
             </a:fld>
             <a:endParaRPr lang="en-US"/>
           </a:p>
@@ -2254,7 +2257,7 @@
           <a:p>
             <a:fld id="{00FF5EA5-A73B-8A4E-AB52-D6AFD1DD9D16}" type="datetimeFigureOut">
               <a:rPr lang="en-US" smtClean="0"/>
-              <a:t>27/01/2013</a:t>
+              <a:t>10/03/2013</a:t>
             </a:fld>
             <a:endParaRPr lang="en-US"/>
           </a:p>
@@ -2507,7 +2510,7 @@
           <a:p>
             <a:fld id="{00FF5EA5-A73B-8A4E-AB52-D6AFD1DD9D16}" type="datetimeFigureOut">
               <a:rPr lang="en-US" smtClean="0"/>
-              <a:t>27/01/2013</a:t>
+              <a:t>10/03/2013</a:t>
             </a:fld>
             <a:endParaRPr lang="en-US"/>
           </a:p>
@@ -2720,7 +2723,7 @@
           <a:p>
             <a:fld id="{00FF5EA5-A73B-8A4E-AB52-D6AFD1DD9D16}" type="datetimeFigureOut">
               <a:rPr lang="en-US" smtClean="0"/>
-              <a:t>27/01/2013</a:t>
+              <a:t>10/03/2013</a:t>
             </a:fld>
             <a:endParaRPr lang="en-US"/>
           </a:p>
@@ -3095,9 +3098,114 @@
           <a:chExt cx="0" cy="0"/>
         </a:xfrm>
       </p:grpSpPr>
+      <p:grpSp>
+        <p:nvGrpSpPr>
+          <p:cNvPr id="5" name="Group 4"/>
+          <p:cNvGrpSpPr/>
+          <p:nvPr/>
+        </p:nvGrpSpPr>
+        <p:grpSpPr>
+          <a:xfrm>
+            <a:off x="508000" y="0"/>
+            <a:ext cx="8207433" cy="5401733"/>
+            <a:chOff x="508000" y="0"/>
+            <a:chExt cx="8207433" cy="5401733"/>
+          </a:xfrm>
+        </p:grpSpPr>
+        <p:pic>
+          <p:nvPicPr>
+            <p:cNvPr id="2" name="Picture 1" descr="AgileSites by Michele Sciabarra 2013-03-10 22-42-00.png"/>
+            <p:cNvPicPr>
+              <a:picLocks noChangeAspect="1"/>
+            </p:cNvPicPr>
+            <p:nvPr/>
+          </p:nvPicPr>
+          <p:blipFill>
+            <a:blip r:embed="rId2">
+              <a:extLst>
+                <a:ext uri="{28A0092B-C50C-407E-A947-70E740481C1C}">
+                  <a14:useLocalDpi xmlns:a14="http://schemas.microsoft.com/office/drawing/2010/main" val="0"/>
+                </a:ext>
+              </a:extLst>
+            </a:blip>
+            <a:stretch>
+              <a:fillRect/>
+            </a:stretch>
+          </p:blipFill>
+          <p:spPr>
+            <a:xfrm>
+              <a:off x="4766733" y="0"/>
+              <a:ext cx="3948700" cy="5401733"/>
+            </a:xfrm>
+            <a:prstGeom prst="rect">
+              <a:avLst/>
+            </a:prstGeom>
+          </p:spPr>
+        </p:pic>
+        <p:pic>
+          <p:nvPicPr>
+            <p:cNvPr id="4" name="Picture 3" descr="AgileSites 2013-03-10 22-36-55.png"/>
+            <p:cNvPicPr>
+              <a:picLocks noChangeAspect="1"/>
+            </p:cNvPicPr>
+            <p:nvPr/>
+          </p:nvPicPr>
+          <p:blipFill>
+            <a:blip r:embed="rId3">
+              <a:extLst>
+                <a:ext uri="{28A0092B-C50C-407E-A947-70E740481C1C}">
+                  <a14:useLocalDpi xmlns:a14="http://schemas.microsoft.com/office/drawing/2010/main" val="0"/>
+                </a:ext>
+              </a:extLst>
+            </a:blip>
+            <a:stretch>
+              <a:fillRect/>
+            </a:stretch>
+          </p:blipFill>
+          <p:spPr>
+            <a:xfrm>
+              <a:off x="508000" y="0"/>
+              <a:ext cx="3911221" cy="5401733"/>
+            </a:xfrm>
+            <a:prstGeom prst="rect">
+              <a:avLst/>
+            </a:prstGeom>
+          </p:spPr>
+        </p:pic>
+      </p:grpSp>
+    </p:spTree>
+    <p:extLst>
+      <p:ext uri="{BB962C8B-B14F-4D97-AF65-F5344CB8AC3E}">
+        <p14:creationId xmlns:p14="http://schemas.microsoft.com/office/powerpoint/2010/main" val="2157068982"/>
+      </p:ext>
+    </p:extLst>
+  </p:cSld>
+  <p:clrMapOvr>
+    <a:masterClrMapping/>
+  </p:clrMapOvr>
+</p:sld>
+</file>
+
+<file path=ppt/slides/slide2.xml><?xml version="1.0" encoding="utf-8"?>
+<p:sld xmlns:a="http://schemas.openxmlformats.org/drawingml/2006/main" xmlns:r="http://schemas.openxmlformats.org/officeDocument/2006/relationships" xmlns:p="http://schemas.openxmlformats.org/presentationml/2006/main">
+  <p:cSld>
+    <p:spTree>
+      <p:nvGrpSpPr>
+        <p:cNvPr id="1" name=""/>
+        <p:cNvGrpSpPr/>
+        <p:nvPr/>
+      </p:nvGrpSpPr>
+      <p:grpSpPr>
+        <a:xfrm>
+          <a:off x="0" y="0"/>
+          <a:ext cx="0" cy="0"/>
+          <a:chOff x="0" y="0"/>
+          <a:chExt cx="0" cy="0"/>
+        </a:xfrm>
+      </p:grpSpPr>
       <p:pic>
         <p:nvPicPr>
-          <p:cNvPr id="2" name="Picture 1" descr="layout.png"/>
+          <p:cNvPr id="2" name="Picture 1" descr="Screen shot 2013-03-10 at 23.30.02.png"/>
           <p:cNvPicPr>
             <a:picLocks noChangeAspect="1"/>
           </p:cNvPicPr>
@@ -3117,120 +3225,175 @@
         </p:blipFill>
         <p:spPr>
           <a:xfrm>
-            <a:off x="2273300" y="0"/>
-            <a:ext cx="4575881" cy="6858000"/>
+            <a:off x="0" y="1054100"/>
+            <a:ext cx="9144000" cy="682538"/>
           </a:xfrm>
           <a:prstGeom prst="rect">
             <a:avLst/>
           </a:prstGeom>
         </p:spPr>
-        <p:style>
-          <a:lnRef idx="2">
-            <a:schemeClr val="accent1"/>
-          </a:lnRef>
-          <a:fillRef idx="1">
-            <a:schemeClr val="lt1"/>
-          </a:fillRef>
-          <a:effectRef idx="0">
-            <a:schemeClr val="accent1"/>
-          </a:effectRef>
-          <a:fontRef idx="minor">
-            <a:schemeClr val="dk1"/>
-          </a:fontRef>
-        </p:style>
       </p:pic>
-      <p:sp>
-        <p:nvSpPr>
-          <p:cNvPr id="3" name="Rectangle 2"/>
-          <p:cNvSpPr/>
+      <p:pic>
+        <p:nvPicPr>
+          <p:cNvPr id="5" name="Picture 4" descr="Screen shot 2013-03-10 at 23.30.28.png"/>
+          <p:cNvPicPr>
+            <a:picLocks noChangeAspect="1"/>
+          </p:cNvPicPr>
           <p:nvPr/>
-        </p:nvSpPr>
+        </p:nvPicPr>
+        <p:blipFill>
+          <a:blip r:embed="rId3">
+            <a:extLst>
+              <a:ext uri="{28A0092B-C50C-407E-A947-70E740481C1C}">
+                <a14:useLocalDpi xmlns:a14="http://schemas.microsoft.com/office/drawing/2010/main" val="0"/>
+              </a:ext>
+            </a:extLst>
+          </a:blip>
+          <a:stretch>
+            <a:fillRect/>
+          </a:stretch>
+        </p:blipFill>
         <p:spPr>
           <a:xfrm>
-            <a:off x="2273300" y="1"/>
-            <a:ext cx="4575881" cy="1414974"/>
+            <a:off x="5613399" y="2044700"/>
+            <a:ext cx="2806700" cy="3073400"/>
           </a:xfrm>
           <a:prstGeom prst="rect">
             <a:avLst/>
           </a:prstGeom>
-          <a:noFill/>
-          <a:ln w="38100" cmpd="sng">
-            <a:solidFill>
-              <a:schemeClr val="accent2"/>
-            </a:solidFill>
-          </a:ln>
         </p:spPr>
-        <p:style>
-          <a:lnRef idx="1">
-            <a:schemeClr val="accent1"/>
-          </a:lnRef>
-          <a:fillRef idx="3">
-            <a:schemeClr val="accent1"/>
-          </a:fillRef>
-          <a:effectRef idx="2">
-            <a:schemeClr val="accent1"/>
-          </a:effectRef>
-          <a:fontRef idx="minor">
-            <a:schemeClr val="lt1"/>
-          </a:fontRef>
-        </p:style>
-        <p:txBody>
-          <a:bodyPr rtlCol="0" anchor="ctr"/>
-          <a:lstStyle/>
-          <a:p>
-            <a:pPr algn="ctr"/>
-            <a:endParaRPr lang="en-US"/>
-          </a:p>
-        </p:txBody>
-      </p:sp>
-      <p:sp>
-        <p:nvSpPr>
-          <p:cNvPr id="4" name="Rounded Rectangle 3"/>
-          <p:cNvSpPr/>
-          <p:nvPr/>
-        </p:nvSpPr>
-        <p:spPr>
-          <a:xfrm>
-            <a:off x="4600126" y="74999"/>
-            <a:ext cx="2175059" cy="319994"/>
-          </a:xfrm>
-          <a:prstGeom prst="roundRect">
-            <a:avLst/>
-          </a:prstGeom>
-          <a:noFill/>
-          <a:ln w="38100" cmpd="sng">
-            <a:solidFill>
-              <a:srgbClr val="800000"/>
-            </a:solidFill>
-          </a:ln>
-        </p:spPr>
-        <p:style>
-          <a:lnRef idx="1">
-            <a:schemeClr val="accent1"/>
-          </a:lnRef>
-          <a:fillRef idx="3">
-            <a:schemeClr val="accent1"/>
-          </a:fillRef>
-          <a:effectRef idx="2">
-            <a:schemeClr val="accent1"/>
-          </a:effectRef>
-          <a:fontRef idx="minor">
-            <a:schemeClr val="lt1"/>
-          </a:fontRef>
-        </p:style>
-        <p:txBody>
-          <a:bodyPr rtlCol="0" anchor="ctr"/>
-          <a:lstStyle/>
-          <a:p>
-            <a:pPr algn="ctr"/>
-            <a:endParaRPr lang="en-US"/>
-          </a:p>
-        </p:txBody>
-      </p:sp>
+      </p:pic>
     </p:spTree>
     <p:extLst>
       <p:ext uri="{BB962C8B-B14F-4D97-AF65-F5344CB8AC3E}">
-        <p14:creationId xmlns:p14="http://schemas.microsoft.com/office/powerpoint/2010/main" val="2391625478"/>
+        <p14:creationId xmlns:p14="http://schemas.microsoft.com/office/powerpoint/2010/main" val="1912901044"/>
+      </p:ext>
+    </p:extLst>
+  </p:cSld>
+  <p:clrMapOvr>
+    <a:masterClrMapping/>
+  </p:clrMapOvr>
+</p:sld>
+</file>
+
+<file path=ppt/slides/slide3.xml><?xml version="1.0" encoding="utf-8"?>
+<p:sld xmlns:a="http://schemas.openxmlformats.org/drawingml/2006/main" xmlns:r="http://schemas.openxmlformats.org/officeDocument/2006/relationships" xmlns:p="http://schemas.openxmlformats.org/presentationml/2006/main">
+  <p:cSld>
+    <p:spTree>
+      <p:nvGrpSpPr>
+        <p:cNvPr id="1" name=""/>
+        <p:cNvGrpSpPr/>
+        <p:nvPr/>
+      </p:nvGrpSpPr>
+      <p:grpSpPr>
+        <a:xfrm>
+          <a:off x="0" y="0"/>
+          <a:ext cx="0" cy="0"/>
+          <a:chOff x="0" y="0"/>
+          <a:chExt cx="0" cy="0"/>
+        </a:xfrm>
+      </p:grpSpPr>
+      <p:pic>
+        <p:nvPicPr>
+          <p:cNvPr id="4" name="Picture 3" descr="Screen shot 2013-03-10 at 23.31.17.png"/>
+          <p:cNvPicPr>
+            <a:picLocks noChangeAspect="1"/>
+          </p:cNvPicPr>
+          <p:nvPr/>
+        </p:nvPicPr>
+        <p:blipFill>
+          <a:blip r:embed="rId2">
+            <a:extLst>
+              <a:ext uri="{28A0092B-C50C-407E-A947-70E740481C1C}">
+                <a14:useLocalDpi xmlns:a14="http://schemas.microsoft.com/office/drawing/2010/main" val="0"/>
+              </a:ext>
+            </a:extLst>
+          </a:blip>
+          <a:stretch>
+            <a:fillRect/>
+          </a:stretch>
+        </p:blipFill>
+        <p:spPr>
+          <a:xfrm>
+            <a:off x="4576233" y="4334933"/>
+            <a:ext cx="2571122" cy="1794934"/>
+          </a:xfrm>
+          <a:prstGeom prst="rect">
+            <a:avLst/>
+          </a:prstGeom>
+        </p:spPr>
+      </p:pic>
+      <p:pic>
+        <p:nvPicPr>
+          <p:cNvPr id="6" name="Picture 5" descr="Screen shot 2013-03-10 at 23.31.32.png"/>
+          <p:cNvPicPr>
+            <a:picLocks noChangeAspect="1"/>
+          </p:cNvPicPr>
+          <p:nvPr/>
+        </p:nvPicPr>
+        <p:blipFill>
+          <a:blip r:embed="rId3">
+            <a:extLst>
+              <a:ext uri="{28A0092B-C50C-407E-A947-70E740481C1C}">
+                <a14:useLocalDpi xmlns:a14="http://schemas.microsoft.com/office/drawing/2010/main" val="0"/>
+              </a:ext>
+            </a:extLst>
+          </a:blip>
+          <a:stretch>
+            <a:fillRect/>
+          </a:stretch>
+        </p:blipFill>
+        <p:spPr>
+          <a:xfrm>
+            <a:off x="893233" y="893233"/>
+            <a:ext cx="7366000" cy="2654300"/>
+          </a:xfrm>
+          <a:prstGeom prst="rect">
+            <a:avLst/>
+          </a:prstGeom>
+        </p:spPr>
+      </p:pic>
+    </p:spTree>
+    <p:extLst>
+      <p:ext uri="{BB962C8B-B14F-4D97-AF65-F5344CB8AC3E}">
+        <p14:creationId xmlns:p14="http://schemas.microsoft.com/office/powerpoint/2010/main" val="3173550233"/>
+      </p:ext>
+    </p:extLst>
+  </p:cSld>
+  <p:clrMapOvr>
+    <a:masterClrMapping/>
+  </p:clrMapOvr>
+  <p:timing>
+    <p:tnLst>
+      <p:par>
+        <p:cTn xmlns:p14="http://schemas.microsoft.com/office/powerpoint/2010/main" id="1" dur="indefinite" restart="never" nodeType="tmRoot"/>
+      </p:par>
+    </p:tnLst>
+  </p:timing>
+</p:sld>
+</file>
+
+<file path=ppt/slides/slide4.xml><?xml version="1.0" encoding="utf-8"?>
+<p:sld xmlns:a="http://schemas.openxmlformats.org/drawingml/2006/main" xmlns:r="http://schemas.openxmlformats.org/officeDocument/2006/relationships" xmlns:p="http://schemas.openxmlformats.org/presentationml/2006/main">
+  <p:cSld>
+    <p:spTree>
+      <p:nvGrpSpPr>
+        <p:cNvPr id="1" name=""/>
+        <p:cNvGrpSpPr/>
+        <p:nvPr/>
+      </p:nvGrpSpPr>
+      <p:grpSpPr>
+        <a:xfrm>
+          <a:off x="0" y="0"/>
+          <a:ext cx="0" cy="0"/>
+          <a:chOff x="0" y="0"/>
+          <a:chExt cx="0" cy="0"/>
+        </a:xfrm>
+      </p:grpSpPr>
+    </p:spTree>
+    <p:extLst>
+      <p:ext uri="{BB962C8B-B14F-4D97-AF65-F5344CB8AC3E}">
+        <p14:creationId xmlns:p14="http://schemas.microsoft.com/office/powerpoint/2010/main" val="1778469781"/>
       </p:ext>
     </p:extLst>
   </p:cSld>

</xml_diff>